<commit_message>
Added class content for anth2151 ancient peoples and places, comp2476 assembly language and operating systems, comp4433 algorithm design and analysis, comp4475 artificial intelligence, and comp4476 cryptography and network security
</commit_message>
<xml_diff>
--- a/anth2151-ancientpeoplesandplaces/TheCollapseOfTheMayaCivilization.pptx
+++ b/anth2151-ancientpeoplesandplaces/TheCollapseOfTheMayaCivilization.pptx
@@ -6,6 +6,7 @@
   </p:sldMasterIdLst>
   <p:sldIdLst>
     <p:sldId id="256" r:id="rId2"/>
+    <p:sldId id="257" r:id="rId3"/>
   </p:sldIdLst>
   <p:sldSz cx="12192000" cy="6858000"/>
   <p:notesSz cx="6858000" cy="9144000"/>
@@ -104,6 +105,11 @@
       </a:defRPr>
     </a:lvl9pPr>
   </p:defaultTextStyle>
+  <p:extLst>
+    <p:ext uri="{EFAFB233-063F-42B5-8137-9DF3F51BA10A}">
+      <p15:sldGuideLst xmlns:p15="http://schemas.microsoft.com/office/powerpoint/2012/main"/>
+    </p:ext>
+  </p:extLst>
 </p:presentation>
 </file>
 
@@ -256,7 +262,7 @@
           <a:p>
             <a:fld id="{E70B44F4-EB80-4661-B4DA-9317950D61AC}" type="datetimeFigureOut">
               <a:rPr lang="en-CA" smtClean="0"/>
-              <a:t>2023-03-02</a:t>
+              <a:t>2023-03-09</a:t>
             </a:fld>
             <a:endParaRPr lang="en-CA"/>
           </a:p>
@@ -456,7 +462,7 @@
           <a:p>
             <a:fld id="{E70B44F4-EB80-4661-B4DA-9317950D61AC}" type="datetimeFigureOut">
               <a:rPr lang="en-CA" smtClean="0"/>
-              <a:t>2023-03-02</a:t>
+              <a:t>2023-03-09</a:t>
             </a:fld>
             <a:endParaRPr lang="en-CA"/>
           </a:p>
@@ -666,7 +672,7 @@
           <a:p>
             <a:fld id="{E70B44F4-EB80-4661-B4DA-9317950D61AC}" type="datetimeFigureOut">
               <a:rPr lang="en-CA" smtClean="0"/>
-              <a:t>2023-03-02</a:t>
+              <a:t>2023-03-09</a:t>
             </a:fld>
             <a:endParaRPr lang="en-CA"/>
           </a:p>
@@ -866,7 +872,7 @@
           <a:p>
             <a:fld id="{E70B44F4-EB80-4661-B4DA-9317950D61AC}" type="datetimeFigureOut">
               <a:rPr lang="en-CA" smtClean="0"/>
-              <a:t>2023-03-02</a:t>
+              <a:t>2023-03-09</a:t>
             </a:fld>
             <a:endParaRPr lang="en-CA"/>
           </a:p>
@@ -1142,7 +1148,7 @@
           <a:p>
             <a:fld id="{E70B44F4-EB80-4661-B4DA-9317950D61AC}" type="datetimeFigureOut">
               <a:rPr lang="en-CA" smtClean="0"/>
-              <a:t>2023-03-02</a:t>
+              <a:t>2023-03-09</a:t>
             </a:fld>
             <a:endParaRPr lang="en-CA"/>
           </a:p>
@@ -1410,7 +1416,7 @@
           <a:p>
             <a:fld id="{E70B44F4-EB80-4661-B4DA-9317950D61AC}" type="datetimeFigureOut">
               <a:rPr lang="en-CA" smtClean="0"/>
-              <a:t>2023-03-02</a:t>
+              <a:t>2023-03-09</a:t>
             </a:fld>
             <a:endParaRPr lang="en-CA"/>
           </a:p>
@@ -1825,7 +1831,7 @@
           <a:p>
             <a:fld id="{E70B44F4-EB80-4661-B4DA-9317950D61AC}" type="datetimeFigureOut">
               <a:rPr lang="en-CA" smtClean="0"/>
-              <a:t>2023-03-02</a:t>
+              <a:t>2023-03-09</a:t>
             </a:fld>
             <a:endParaRPr lang="en-CA"/>
           </a:p>
@@ -1967,7 +1973,7 @@
           <a:p>
             <a:fld id="{E70B44F4-EB80-4661-B4DA-9317950D61AC}" type="datetimeFigureOut">
               <a:rPr lang="en-CA" smtClean="0"/>
-              <a:t>2023-03-02</a:t>
+              <a:t>2023-03-09</a:t>
             </a:fld>
             <a:endParaRPr lang="en-CA"/>
           </a:p>
@@ -2080,7 +2086,7 @@
           <a:p>
             <a:fld id="{E70B44F4-EB80-4661-B4DA-9317950D61AC}" type="datetimeFigureOut">
               <a:rPr lang="en-CA" smtClean="0"/>
-              <a:t>2023-03-02</a:t>
+              <a:t>2023-03-09</a:t>
             </a:fld>
             <a:endParaRPr lang="en-CA"/>
           </a:p>
@@ -2393,7 +2399,7 @@
           <a:p>
             <a:fld id="{E70B44F4-EB80-4661-B4DA-9317950D61AC}" type="datetimeFigureOut">
               <a:rPr lang="en-CA" smtClean="0"/>
-              <a:t>2023-03-02</a:t>
+              <a:t>2023-03-09</a:t>
             </a:fld>
             <a:endParaRPr lang="en-CA"/>
           </a:p>
@@ -2682,7 +2688,7 @@
           <a:p>
             <a:fld id="{E70B44F4-EB80-4661-B4DA-9317950D61AC}" type="datetimeFigureOut">
               <a:rPr lang="en-CA" smtClean="0"/>
-              <a:t>2023-03-02</a:t>
+              <a:t>2023-03-09</a:t>
             </a:fld>
             <a:endParaRPr lang="en-CA"/>
           </a:p>
@@ -2925,7 +2931,7 @@
           <a:p>
             <a:fld id="{E70B44F4-EB80-4661-B4DA-9317950D61AC}" type="datetimeFigureOut">
               <a:rPr lang="en-CA" smtClean="0"/>
-              <a:t>2023-03-02</a:t>
+              <a:t>2023-03-09</a:t>
             </a:fld>
             <a:endParaRPr lang="en-CA"/>
           </a:p>
@@ -3344,10 +3350,10 @@
       </p:grpSpPr>
       <p:sp>
         <p:nvSpPr>
-          <p:cNvPr id="2" name="Title 1">
-            <a:extLst>
-              <a:ext uri="{FF2B5EF4-FFF2-40B4-BE49-F238E27FC236}">
-                <a16:creationId xmlns:a16="http://schemas.microsoft.com/office/drawing/2014/main" id="{B5F9F5CA-A69E-886B-6C73-790DBC125B49}"/>
+          <p:cNvPr id="7" name="Title 6">
+            <a:extLst>
+              <a:ext uri="{FF2B5EF4-FFF2-40B4-BE49-F238E27FC236}">
+                <a16:creationId xmlns:a16="http://schemas.microsoft.com/office/drawing/2014/main" id="{33729F96-A268-E4FB-9464-A2C3E87506C4}"/>
               </a:ext>
             </a:extLst>
           </p:cNvPr>
@@ -3358,44 +3364,185 @@
             <p:ph type="ctrTitle"/>
           </p:nvPr>
         </p:nvSpPr>
-        <p:spPr/>
-        <p:txBody>
-          <a:bodyPr/>
-          <a:lstStyle/>
-          <a:p>
-            <a:endParaRPr lang="en-CA"/>
-          </a:p>
-        </p:txBody>
-      </p:sp>
-      <p:sp>
-        <p:nvSpPr>
-          <p:cNvPr id="3" name="Subtitle 2">
-            <a:extLst>
-              <a:ext uri="{FF2B5EF4-FFF2-40B4-BE49-F238E27FC236}">
-                <a16:creationId xmlns:a16="http://schemas.microsoft.com/office/drawing/2014/main" id="{6970C01B-847E-883B-10E6-7A1C64A7263A}"/>
-              </a:ext>
-            </a:extLst>
-          </p:cNvPr>
-          <p:cNvSpPr>
-            <a:spLocks noGrp="1"/>
-          </p:cNvSpPr>
-          <p:nvPr>
-            <p:ph type="subTitle" idx="1"/>
-          </p:nvPr>
-        </p:nvSpPr>
-        <p:spPr/>
-        <p:txBody>
-          <a:bodyPr/>
-          <a:lstStyle/>
-          <a:p>
-            <a:endParaRPr lang="en-CA"/>
-          </a:p>
-        </p:txBody>
-      </p:sp>
+        <p:spPr>
+          <a:xfrm>
+            <a:off x="1455532" y="0"/>
+            <a:ext cx="9144000" cy="816429"/>
+          </a:xfrm>
+        </p:spPr>
+        <p:txBody>
+          <a:bodyPr anchor="ctr">
+            <a:noAutofit/>
+          </a:bodyPr>
+          <a:lstStyle/>
+          <a:p>
+            <a:r>
+              <a:rPr lang="en-US" sz="3200" b="1" dirty="0">
+                <a:latin typeface="Arial" panose="020B0604020202020204" pitchFamily="34" charset="0"/>
+                <a:cs typeface="Arial" panose="020B0604020202020204" pitchFamily="34" charset="0"/>
+              </a:rPr>
+              <a:t>The collapse of the ancient Maya civilization</a:t>
+            </a:r>
+            <a:endParaRPr lang="en-CA" sz="3200" b="1" dirty="0">
+              <a:latin typeface="Arial" panose="020B0604020202020204" pitchFamily="34" charset="0"/>
+              <a:cs typeface="Arial" panose="020B0604020202020204" pitchFamily="34" charset="0"/>
+            </a:endParaRPr>
+          </a:p>
+        </p:txBody>
+      </p:sp>
+      <p:pic>
+        <p:nvPicPr>
+          <p:cNvPr id="10" name="Picture 9" descr="A picture containing grass, rock, building, outdoor&#10;&#10;Description automatically generated">
+            <a:extLst>
+              <a:ext uri="{FF2B5EF4-FFF2-40B4-BE49-F238E27FC236}">
+                <a16:creationId xmlns:a16="http://schemas.microsoft.com/office/drawing/2014/main" id="{9009B968-D377-726F-7249-F127F0F1C65C}"/>
+              </a:ext>
+            </a:extLst>
+          </p:cNvPr>
+          <p:cNvPicPr>
+            <a:picLocks noChangeAspect="1"/>
+          </p:cNvPicPr>
+          <p:nvPr/>
+        </p:nvPicPr>
+        <p:blipFill>
+          <a:blip r:embed="rId2">
+            <a:extLst>
+              <a:ext uri="{28A0092B-C50C-407E-A947-70E740481C1C}">
+                <a14:useLocalDpi xmlns:a14="http://schemas.microsoft.com/office/drawing/2010/main" val="0"/>
+              </a:ext>
+            </a:extLst>
+          </a:blip>
+          <a:stretch>
+            <a:fillRect/>
+          </a:stretch>
+        </p:blipFill>
+        <p:spPr>
+          <a:xfrm>
+            <a:off x="2006016" y="816429"/>
+            <a:ext cx="8043031" cy="6036436"/>
+          </a:xfrm>
+          <a:prstGeom prst="rect">
+            <a:avLst/>
+          </a:prstGeom>
+        </p:spPr>
+      </p:pic>
     </p:spTree>
     <p:extLst>
       <p:ext uri="{BB962C8B-B14F-4D97-AF65-F5344CB8AC3E}">
         <p14:creationId xmlns:p14="http://schemas.microsoft.com/office/powerpoint/2010/main" val="3318353791"/>
+      </p:ext>
+    </p:extLst>
+  </p:cSld>
+  <p:clrMapOvr>
+    <a:masterClrMapping/>
+  </p:clrMapOvr>
+</p:sld>
+</file>
+
+<file path=ppt/slides/slide2.xml><?xml version="1.0" encoding="utf-8"?>
+<p:sld xmlns:a="http://schemas.openxmlformats.org/drawingml/2006/main" xmlns:r="http://schemas.openxmlformats.org/officeDocument/2006/relationships" xmlns:p="http://schemas.openxmlformats.org/presentationml/2006/main">
+  <p:cSld>
+    <p:spTree>
+      <p:nvGrpSpPr>
+        <p:cNvPr id="1" name=""/>
+        <p:cNvGrpSpPr/>
+        <p:nvPr/>
+      </p:nvGrpSpPr>
+      <p:grpSpPr>
+        <a:xfrm>
+          <a:off x="0" y="0"/>
+          <a:ext cx="0" cy="0"/>
+          <a:chOff x="0" y="0"/>
+          <a:chExt cx="0" cy="0"/>
+        </a:xfrm>
+      </p:grpSpPr>
+      <p:sp>
+        <p:nvSpPr>
+          <p:cNvPr id="2" name="Title 1">
+            <a:extLst>
+              <a:ext uri="{FF2B5EF4-FFF2-40B4-BE49-F238E27FC236}">
+                <a16:creationId xmlns:a16="http://schemas.microsoft.com/office/drawing/2014/main" id="{4C27BB16-499C-1AE7-D396-5CE4B4DF0FDB}"/>
+              </a:ext>
+            </a:extLst>
+          </p:cNvPr>
+          <p:cNvSpPr>
+            <a:spLocks noGrp="1"/>
+          </p:cNvSpPr>
+          <p:nvPr>
+            <p:ph type="title"/>
+          </p:nvPr>
+        </p:nvSpPr>
+        <p:spPr>
+          <a:xfrm>
+            <a:off x="838200" y="0"/>
+            <a:ext cx="10515600" cy="503339"/>
+          </a:xfrm>
+        </p:spPr>
+        <p:txBody>
+          <a:bodyPr>
+            <a:noAutofit/>
+          </a:bodyPr>
+          <a:lstStyle/>
+          <a:p>
+            <a:pPr algn="ctr"/>
+            <a:endParaRPr lang="en-CA" sz="2000" dirty="0"/>
+          </a:p>
+        </p:txBody>
+      </p:sp>
+      <p:sp>
+        <p:nvSpPr>
+          <p:cNvPr id="3" name="Content Placeholder 2">
+            <a:extLst>
+              <a:ext uri="{FF2B5EF4-FFF2-40B4-BE49-F238E27FC236}">
+                <a16:creationId xmlns:a16="http://schemas.microsoft.com/office/drawing/2014/main" id="{924FD93C-4EFC-6AB0-FCB9-F76054827F44}"/>
+              </a:ext>
+            </a:extLst>
+          </p:cNvPr>
+          <p:cNvSpPr>
+            <a:spLocks noGrp="1"/>
+          </p:cNvSpPr>
+          <p:nvPr>
+            <p:ph sz="half" idx="1"/>
+          </p:nvPr>
+        </p:nvSpPr>
+        <p:spPr/>
+        <p:txBody>
+          <a:bodyPr/>
+          <a:lstStyle/>
+          <a:p>
+            <a:endParaRPr lang="en-CA"/>
+          </a:p>
+        </p:txBody>
+      </p:sp>
+      <p:sp>
+        <p:nvSpPr>
+          <p:cNvPr id="4" name="Content Placeholder 3">
+            <a:extLst>
+              <a:ext uri="{FF2B5EF4-FFF2-40B4-BE49-F238E27FC236}">
+                <a16:creationId xmlns:a16="http://schemas.microsoft.com/office/drawing/2014/main" id="{ADA678AB-B2F3-074B-5291-E72657E585F2}"/>
+              </a:ext>
+            </a:extLst>
+          </p:cNvPr>
+          <p:cNvSpPr>
+            <a:spLocks noGrp="1"/>
+          </p:cNvSpPr>
+          <p:nvPr>
+            <p:ph sz="half" idx="2"/>
+          </p:nvPr>
+        </p:nvSpPr>
+        <p:spPr/>
+        <p:txBody>
+          <a:bodyPr/>
+          <a:lstStyle/>
+          <a:p>
+            <a:endParaRPr lang="en-CA"/>
+          </a:p>
+        </p:txBody>
+      </p:sp>
+    </p:spTree>
+    <p:extLst>
+      <p:ext uri="{BB962C8B-B14F-4D97-AF65-F5344CB8AC3E}">
+        <p14:creationId xmlns:p14="http://schemas.microsoft.com/office/powerpoint/2010/main" val="2492479861"/>
       </p:ext>
     </p:extLst>
   </p:cSld>

</xml_diff>

<commit_message>
Added the template research paper copy we will use for comp4476 cryptographic network security. Added more content to the presentation documentary on anth2151
</commit_message>
<xml_diff>
--- a/anth2151-ancientpeoplesandplaces/TheCollapseOfTheMayaCivilization.pptx
+++ b/anth2151-ancientpeoplesandplaces/TheCollapseOfTheMayaCivilization.pptx
@@ -7,6 +7,9 @@
   <p:sldIdLst>
     <p:sldId id="256" r:id="rId2"/>
     <p:sldId id="257" r:id="rId3"/>
+    <p:sldId id="258" r:id="rId4"/>
+    <p:sldId id="259" r:id="rId5"/>
+    <p:sldId id="260" r:id="rId6"/>
   </p:sldIdLst>
   <p:sldSz cx="12192000" cy="6858000"/>
   <p:notesSz cx="6858000" cy="9144000"/>
@@ -113,6 +116,90 @@
 </p:presentation>
 </file>
 
+<file path=ppt/ink/ink1.xml><?xml version="1.0" encoding="utf-8"?>
+<inkml:ink xmlns:inkml="http://www.w3.org/2003/InkML">
+  <inkml:definitions>
+    <inkml:context xml:id="ctx0">
+      <inkml:inkSource xml:id="inkSrc0">
+        <inkml:traceFormat>
+          <inkml:channel name="X" type="integer" min="-2.14748E9" max="2.14748E9" units="cm"/>
+          <inkml:channel name="Y" type="integer" min="-2.14748E9" max="2.14748E9" units="cm"/>
+          <inkml:channel name="F" type="integer" max="32767" units="dev"/>
+        </inkml:traceFormat>
+        <inkml:channelProperties>
+          <inkml:channelProperty channel="X" name="resolution" value="1000" units="1/cm"/>
+          <inkml:channelProperty channel="Y" name="resolution" value="1000" units="1/cm"/>
+          <inkml:channelProperty channel="F" name="resolution" value="0" units="1/dev"/>
+        </inkml:channelProperties>
+      </inkml:inkSource>
+      <inkml:timestamp xml:id="ts0" timeString="2023-03-10T18:43:42.314"/>
+    </inkml:context>
+    <inkml:brush xml:id="br0">
+      <inkml:brushProperty name="width" value="0.05" units="cm"/>
+      <inkml:brushProperty name="height" value="0.05" units="cm"/>
+      <inkml:brushProperty name="color" value="#CC0066"/>
+    </inkml:brush>
+  </inkml:definitions>
+  <inkml:trace contextRef="#ctx0" brushRef="#br0">1 1 24575,'0'0'-8191</inkml:trace>
+</inkml:ink>
+</file>
+
+<file path=ppt/ink/ink2.xml><?xml version="1.0" encoding="utf-8"?>
+<inkml:ink xmlns:inkml="http://www.w3.org/2003/InkML">
+  <inkml:definitions>
+    <inkml:context xml:id="ctx0">
+      <inkml:inkSource xml:id="inkSrc0">
+        <inkml:traceFormat>
+          <inkml:channel name="X" type="integer" min="-2.14748E9" max="2.14748E9" units="cm"/>
+          <inkml:channel name="Y" type="integer" min="-2.14748E9" max="2.14748E9" units="cm"/>
+          <inkml:channel name="F" type="integer" max="32767" units="dev"/>
+        </inkml:traceFormat>
+        <inkml:channelProperties>
+          <inkml:channelProperty channel="X" name="resolution" value="1000" units="1/cm"/>
+          <inkml:channelProperty channel="Y" name="resolution" value="1000" units="1/cm"/>
+          <inkml:channelProperty channel="F" name="resolution" value="0" units="1/dev"/>
+        </inkml:channelProperties>
+      </inkml:inkSource>
+      <inkml:timestamp xml:id="ts0" timeString="2023-03-10T18:43:42.314"/>
+    </inkml:context>
+    <inkml:brush xml:id="br0">
+      <inkml:brushProperty name="width" value="0.05" units="cm"/>
+      <inkml:brushProperty name="height" value="0.05" units="cm"/>
+      <inkml:brushProperty name="color" value="#CC0066"/>
+    </inkml:brush>
+  </inkml:definitions>
+  <inkml:trace contextRef="#ctx0" brushRef="#br0">1 1 24575,'0'0'-8191</inkml:trace>
+</inkml:ink>
+</file>
+
+<file path=ppt/ink/ink3.xml><?xml version="1.0" encoding="utf-8"?>
+<inkml:ink xmlns:inkml="http://www.w3.org/2003/InkML">
+  <inkml:definitions>
+    <inkml:context xml:id="ctx0">
+      <inkml:inkSource xml:id="inkSrc0">
+        <inkml:traceFormat>
+          <inkml:channel name="X" type="integer" min="-2.14748E9" max="2.14748E9" units="cm"/>
+          <inkml:channel name="Y" type="integer" min="-2.14748E9" max="2.14748E9" units="cm"/>
+          <inkml:channel name="F" type="integer" max="32767" units="dev"/>
+        </inkml:traceFormat>
+        <inkml:channelProperties>
+          <inkml:channelProperty channel="X" name="resolution" value="1000" units="1/cm"/>
+          <inkml:channelProperty channel="Y" name="resolution" value="1000" units="1/cm"/>
+          <inkml:channelProperty channel="F" name="resolution" value="0" units="1/dev"/>
+        </inkml:channelProperties>
+      </inkml:inkSource>
+      <inkml:timestamp xml:id="ts0" timeString="2023-03-10T18:43:42.314"/>
+    </inkml:context>
+    <inkml:brush xml:id="br0">
+      <inkml:brushProperty name="width" value="0.05" units="cm"/>
+      <inkml:brushProperty name="height" value="0.05" units="cm"/>
+      <inkml:brushProperty name="color" value="#CC0066"/>
+    </inkml:brush>
+  </inkml:definitions>
+  <inkml:trace contextRef="#ctx0" brushRef="#br0">1 1 24575,'0'0'-8191</inkml:trace>
+</inkml:ink>
+</file>
+
 <file path=ppt/slideLayouts/slideLayout1.xml><?xml version="1.0" encoding="utf-8"?>
 <p:sldLayout xmlns:a="http://schemas.openxmlformats.org/drawingml/2006/main" xmlns:r="http://schemas.openxmlformats.org/officeDocument/2006/relationships" xmlns:p="http://schemas.openxmlformats.org/presentationml/2006/main" type="title" preserve="1">
   <p:cSld name="Title Slide">
@@ -262,7 +349,7 @@
           <a:p>
             <a:fld id="{E70B44F4-EB80-4661-B4DA-9317950D61AC}" type="datetimeFigureOut">
               <a:rPr lang="en-CA" smtClean="0"/>
-              <a:t>2023-03-09</a:t>
+              <a:t>2023-03-10</a:t>
             </a:fld>
             <a:endParaRPr lang="en-CA"/>
           </a:p>
@@ -462,7 +549,7 @@
           <a:p>
             <a:fld id="{E70B44F4-EB80-4661-B4DA-9317950D61AC}" type="datetimeFigureOut">
               <a:rPr lang="en-CA" smtClean="0"/>
-              <a:t>2023-03-09</a:t>
+              <a:t>2023-03-10</a:t>
             </a:fld>
             <a:endParaRPr lang="en-CA"/>
           </a:p>
@@ -672,7 +759,7 @@
           <a:p>
             <a:fld id="{E70B44F4-EB80-4661-B4DA-9317950D61AC}" type="datetimeFigureOut">
               <a:rPr lang="en-CA" smtClean="0"/>
-              <a:t>2023-03-09</a:t>
+              <a:t>2023-03-10</a:t>
             </a:fld>
             <a:endParaRPr lang="en-CA"/>
           </a:p>
@@ -872,7 +959,7 @@
           <a:p>
             <a:fld id="{E70B44F4-EB80-4661-B4DA-9317950D61AC}" type="datetimeFigureOut">
               <a:rPr lang="en-CA" smtClean="0"/>
-              <a:t>2023-03-09</a:t>
+              <a:t>2023-03-10</a:t>
             </a:fld>
             <a:endParaRPr lang="en-CA"/>
           </a:p>
@@ -1148,7 +1235,7 @@
           <a:p>
             <a:fld id="{E70B44F4-EB80-4661-B4DA-9317950D61AC}" type="datetimeFigureOut">
               <a:rPr lang="en-CA" smtClean="0"/>
-              <a:t>2023-03-09</a:t>
+              <a:t>2023-03-10</a:t>
             </a:fld>
             <a:endParaRPr lang="en-CA"/>
           </a:p>
@@ -1416,7 +1503,7 @@
           <a:p>
             <a:fld id="{E70B44F4-EB80-4661-B4DA-9317950D61AC}" type="datetimeFigureOut">
               <a:rPr lang="en-CA" smtClean="0"/>
-              <a:t>2023-03-09</a:t>
+              <a:t>2023-03-10</a:t>
             </a:fld>
             <a:endParaRPr lang="en-CA"/>
           </a:p>
@@ -1831,7 +1918,7 @@
           <a:p>
             <a:fld id="{E70B44F4-EB80-4661-B4DA-9317950D61AC}" type="datetimeFigureOut">
               <a:rPr lang="en-CA" smtClean="0"/>
-              <a:t>2023-03-09</a:t>
+              <a:t>2023-03-10</a:t>
             </a:fld>
             <a:endParaRPr lang="en-CA"/>
           </a:p>
@@ -1973,7 +2060,7 @@
           <a:p>
             <a:fld id="{E70B44F4-EB80-4661-B4DA-9317950D61AC}" type="datetimeFigureOut">
               <a:rPr lang="en-CA" smtClean="0"/>
-              <a:t>2023-03-09</a:t>
+              <a:t>2023-03-10</a:t>
             </a:fld>
             <a:endParaRPr lang="en-CA"/>
           </a:p>
@@ -2086,7 +2173,7 @@
           <a:p>
             <a:fld id="{E70B44F4-EB80-4661-B4DA-9317950D61AC}" type="datetimeFigureOut">
               <a:rPr lang="en-CA" smtClean="0"/>
-              <a:t>2023-03-09</a:t>
+              <a:t>2023-03-10</a:t>
             </a:fld>
             <a:endParaRPr lang="en-CA"/>
           </a:p>
@@ -2399,7 +2486,7 @@
           <a:p>
             <a:fld id="{E70B44F4-EB80-4661-B4DA-9317950D61AC}" type="datetimeFigureOut">
               <a:rPr lang="en-CA" smtClean="0"/>
-              <a:t>2023-03-09</a:t>
+              <a:t>2023-03-10</a:t>
             </a:fld>
             <a:endParaRPr lang="en-CA"/>
           </a:p>
@@ -2688,7 +2775,7 @@
           <a:p>
             <a:fld id="{E70B44F4-EB80-4661-B4DA-9317950D61AC}" type="datetimeFigureOut">
               <a:rPr lang="en-CA" smtClean="0"/>
-              <a:t>2023-03-09</a:t>
+              <a:t>2023-03-10</a:t>
             </a:fld>
             <a:endParaRPr lang="en-CA"/>
           </a:p>
@@ -2931,7 +3018,7 @@
           <a:p>
             <a:fld id="{E70B44F4-EB80-4661-B4DA-9317950D61AC}" type="datetimeFigureOut">
               <a:rPr lang="en-CA" smtClean="0"/>
-              <a:t>2023-03-09</a:t>
+              <a:t>2023-03-10</a:t>
             </a:fld>
             <a:endParaRPr lang="en-CA"/>
           </a:p>
@@ -3456,86 +3543,88 @@
           <a:chExt cx="0" cy="0"/>
         </a:xfrm>
       </p:grpSpPr>
-      <p:sp>
-        <p:nvSpPr>
-          <p:cNvPr id="2" name="Title 1">
-            <a:extLst>
-              <a:ext uri="{FF2B5EF4-FFF2-40B4-BE49-F238E27FC236}">
-                <a16:creationId xmlns:a16="http://schemas.microsoft.com/office/drawing/2014/main" id="{4C27BB16-499C-1AE7-D396-5CE4B4DF0FDB}"/>
-              </a:ext>
-            </a:extLst>
-          </p:cNvPr>
-          <p:cNvSpPr>
-            <a:spLocks noGrp="1"/>
-          </p:cNvSpPr>
-          <p:nvPr>
-            <p:ph type="title"/>
-          </p:nvPr>
-        </p:nvSpPr>
+      <p:pic>
+        <p:nvPicPr>
+          <p:cNvPr id="6" name="Content Placeholder 5" descr="Map&#10;&#10;Description automatically generated">
+            <a:extLst>
+              <a:ext uri="{FF2B5EF4-FFF2-40B4-BE49-F238E27FC236}">
+                <a16:creationId xmlns:a16="http://schemas.microsoft.com/office/drawing/2014/main" id="{81E9E291-3C57-DEE8-79CA-50E80D624D94}"/>
+              </a:ext>
+            </a:extLst>
+          </p:cNvPr>
+          <p:cNvPicPr>
+            <a:picLocks noGrp="1" noChangeAspect="1"/>
+          </p:cNvPicPr>
+          <p:nvPr>
+            <p:ph sz="half" idx="1"/>
+          </p:nvPr>
+        </p:nvPicPr>
+        <p:blipFill>
+          <a:blip r:embed="rId2">
+            <a:extLst>
+              <a:ext uri="{28A0092B-C50C-407E-A947-70E740481C1C}">
+                <a14:useLocalDpi xmlns:a14="http://schemas.microsoft.com/office/drawing/2010/main" val="0"/>
+              </a:ext>
+            </a:extLst>
+          </a:blip>
+          <a:stretch>
+            <a:fillRect/>
+          </a:stretch>
+        </p:blipFill>
         <p:spPr>
           <a:xfrm>
-            <a:off x="838200" y="0"/>
-            <a:ext cx="10515600" cy="503339"/>
+            <a:off x="-14269" y="826316"/>
+            <a:ext cx="6186469" cy="5000636"/>
           </a:xfrm>
         </p:spPr>
+      </p:pic>
+      <p:sp>
+        <p:nvSpPr>
+          <p:cNvPr id="4" name="Content Placeholder 3">
+            <a:extLst>
+              <a:ext uri="{FF2B5EF4-FFF2-40B4-BE49-F238E27FC236}">
+                <a16:creationId xmlns:a16="http://schemas.microsoft.com/office/drawing/2014/main" id="{ADA678AB-B2F3-074B-5291-E72657E585F2}"/>
+              </a:ext>
+            </a:extLst>
+          </p:cNvPr>
+          <p:cNvSpPr>
+            <a:spLocks noGrp="1"/>
+          </p:cNvSpPr>
+          <p:nvPr>
+            <p:ph sz="half" idx="2"/>
+          </p:nvPr>
+        </p:nvSpPr>
+        <p:spPr>
+          <a:xfrm>
+            <a:off x="6172200" y="823690"/>
+            <a:ext cx="5181600" cy="5413565"/>
+          </a:xfrm>
+        </p:spPr>
         <p:txBody>
           <a:bodyPr>
-            <a:noAutofit/>
+            <a:normAutofit/>
           </a:bodyPr>
           <a:lstStyle/>
           <a:p>
-            <a:pPr algn="ctr"/>
-            <a:endParaRPr lang="en-CA" sz="2000" dirty="0"/>
-          </a:p>
-        </p:txBody>
-      </p:sp>
-      <p:sp>
-        <p:nvSpPr>
-          <p:cNvPr id="3" name="Content Placeholder 2">
-            <a:extLst>
-              <a:ext uri="{FF2B5EF4-FFF2-40B4-BE49-F238E27FC236}">
-                <a16:creationId xmlns:a16="http://schemas.microsoft.com/office/drawing/2014/main" id="{924FD93C-4EFC-6AB0-FCB9-F76054827F44}"/>
-              </a:ext>
-            </a:extLst>
-          </p:cNvPr>
-          <p:cNvSpPr>
-            <a:spLocks noGrp="1"/>
-          </p:cNvSpPr>
-          <p:nvPr>
-            <p:ph sz="half" idx="1"/>
-          </p:nvPr>
-        </p:nvSpPr>
-        <p:spPr/>
-        <p:txBody>
-          <a:bodyPr/>
-          <a:lstStyle/>
-          <a:p>
-            <a:endParaRPr lang="en-CA"/>
-          </a:p>
-        </p:txBody>
-      </p:sp>
-      <p:sp>
-        <p:nvSpPr>
-          <p:cNvPr id="4" name="Content Placeholder 3">
-            <a:extLst>
-              <a:ext uri="{FF2B5EF4-FFF2-40B4-BE49-F238E27FC236}">
-                <a16:creationId xmlns:a16="http://schemas.microsoft.com/office/drawing/2014/main" id="{ADA678AB-B2F3-074B-5291-E72657E585F2}"/>
-              </a:ext>
-            </a:extLst>
-          </p:cNvPr>
-          <p:cNvSpPr>
-            <a:spLocks noGrp="1"/>
-          </p:cNvSpPr>
-          <p:nvPr>
-            <p:ph sz="half" idx="2"/>
-          </p:nvPr>
-        </p:nvSpPr>
-        <p:spPr/>
-        <p:txBody>
-          <a:bodyPr/>
-          <a:lstStyle/>
-          <a:p>
-            <a:endParaRPr lang="en-CA"/>
+            <a:pPr marL="0" indent="0">
+              <a:buNone/>
+            </a:pPr>
+            <a:endParaRPr lang="en-US" sz="1600" dirty="0"/>
+          </a:p>
+          <a:p>
+            <a:pPr marL="0" indent="0" defTabSz="360000">
+              <a:lnSpc>
+                <a:spcPct val="200000"/>
+              </a:lnSpc>
+              <a:spcBef>
+                <a:spcPts val="600"/>
+              </a:spcBef>
+              <a:buNone/>
+            </a:pPr>
+            <a:r>
+              <a:rPr lang="en-CA" sz="1600" dirty="0"/>
+              <a:t>	From approximately 1800 B.C. to 1050 A.D., the Maya civilization was one of the most dominant indigenous societies of Mesoamerica. Located south of modern-day Mexico and north of modern-day South America, the Maya utilized both agricultural techniques and hunter-gatherer techniques and were centred around the Gulf of Mexico and the Caribbean Sea. </a:t>
+            </a:r>
           </a:p>
         </p:txBody>
       </p:sp>
@@ -3543,6 +3632,708 @@
     <p:extLst>
       <p:ext uri="{BB962C8B-B14F-4D97-AF65-F5344CB8AC3E}">
         <p14:creationId xmlns:p14="http://schemas.microsoft.com/office/powerpoint/2010/main" val="2492479861"/>
+      </p:ext>
+    </p:extLst>
+  </p:cSld>
+  <p:clrMapOvr>
+    <a:masterClrMapping/>
+  </p:clrMapOvr>
+</p:sld>
+</file>
+
+<file path=ppt/slides/slide3.xml><?xml version="1.0" encoding="utf-8"?>
+<p:sld xmlns:a="http://schemas.openxmlformats.org/drawingml/2006/main" xmlns:r="http://schemas.openxmlformats.org/officeDocument/2006/relationships" xmlns:p="http://schemas.openxmlformats.org/presentationml/2006/main">
+  <p:cSld>
+    <p:spTree>
+      <p:nvGrpSpPr>
+        <p:cNvPr id="1" name=""/>
+        <p:cNvGrpSpPr/>
+        <p:nvPr/>
+      </p:nvGrpSpPr>
+      <p:grpSpPr>
+        <a:xfrm>
+          <a:off x="0" y="0"/>
+          <a:ext cx="0" cy="0"/>
+          <a:chOff x="0" y="0"/>
+          <a:chExt cx="0" cy="0"/>
+        </a:xfrm>
+      </p:grpSpPr>
+      <p:pic>
+        <p:nvPicPr>
+          <p:cNvPr id="6" name="Content Placeholder 5" descr="Map&#10;&#10;Description automatically generated">
+            <a:extLst>
+              <a:ext uri="{FF2B5EF4-FFF2-40B4-BE49-F238E27FC236}">
+                <a16:creationId xmlns:a16="http://schemas.microsoft.com/office/drawing/2014/main" id="{81E9E291-3C57-DEE8-79CA-50E80D624D94}"/>
+              </a:ext>
+            </a:extLst>
+          </p:cNvPr>
+          <p:cNvPicPr>
+            <a:picLocks noGrp="1" noChangeAspect="1"/>
+          </p:cNvPicPr>
+          <p:nvPr>
+            <p:ph sz="half" idx="1"/>
+          </p:nvPr>
+        </p:nvPicPr>
+        <p:blipFill>
+          <a:blip r:embed="rId2">
+            <a:extLst>
+              <a:ext uri="{28A0092B-C50C-407E-A947-70E740481C1C}">
+                <a14:useLocalDpi xmlns:a14="http://schemas.microsoft.com/office/drawing/2010/main" val="0"/>
+              </a:ext>
+            </a:extLst>
+          </a:blip>
+          <a:stretch>
+            <a:fillRect/>
+          </a:stretch>
+        </p:blipFill>
+        <p:spPr>
+          <a:xfrm>
+            <a:off x="-14269" y="823690"/>
+            <a:ext cx="6186469" cy="5000636"/>
+          </a:xfrm>
+        </p:spPr>
+      </p:pic>
+      <p:sp>
+        <p:nvSpPr>
+          <p:cNvPr id="4" name="Content Placeholder 3">
+            <a:extLst>
+              <a:ext uri="{FF2B5EF4-FFF2-40B4-BE49-F238E27FC236}">
+                <a16:creationId xmlns:a16="http://schemas.microsoft.com/office/drawing/2014/main" id="{ADA678AB-B2F3-074B-5291-E72657E585F2}"/>
+              </a:ext>
+            </a:extLst>
+          </p:cNvPr>
+          <p:cNvSpPr>
+            <a:spLocks noGrp="1"/>
+          </p:cNvSpPr>
+          <p:nvPr>
+            <p:ph sz="half" idx="2"/>
+          </p:nvPr>
+        </p:nvSpPr>
+        <p:spPr>
+          <a:xfrm>
+            <a:off x="6172200" y="823690"/>
+            <a:ext cx="5181600" cy="5413565"/>
+          </a:xfrm>
+        </p:spPr>
+        <p:txBody>
+          <a:bodyPr>
+            <a:normAutofit/>
+          </a:bodyPr>
+          <a:lstStyle/>
+          <a:p>
+            <a:pPr marL="0" indent="0">
+              <a:buNone/>
+            </a:pPr>
+            <a:endParaRPr lang="en-US" sz="1600" dirty="0"/>
+          </a:p>
+          <a:p>
+            <a:pPr marL="0" indent="0" defTabSz="360000">
+              <a:lnSpc>
+                <a:spcPct val="200000"/>
+              </a:lnSpc>
+              <a:spcBef>
+                <a:spcPts val="600"/>
+              </a:spcBef>
+              <a:buNone/>
+            </a:pPr>
+            <a:r>
+              <a:rPr lang="en-CA" sz="1600" dirty="0"/>
+              <a:t>	The Maya lived in three areas with distinct cultural and environmental differences, the first of which was The Northern Maya Lowlands. They were located primarily in the Yucatán Peninsula, near the Yucatán Maya, marked on the map in a red circle. </a:t>
+            </a:r>
+          </a:p>
+        </p:txBody>
+      </p:sp>
+      <mc:AlternateContent xmlns:mc="http://schemas.openxmlformats.org/markup-compatibility/2006">
+        <mc:Choice xmlns:p14="http://schemas.microsoft.com/office/powerpoint/2010/main" Requires="p14">
+          <p:contentPart p14:bwMode="auto" r:id="rId3">
+            <p14:nvContentPartPr>
+              <p14:cNvPr id="2" name="Ink 1">
+                <a:extLst>
+                  <a:ext uri="{FF2B5EF4-FFF2-40B4-BE49-F238E27FC236}">
+                    <a16:creationId xmlns:a16="http://schemas.microsoft.com/office/drawing/2014/main" id="{DFA62668-2D1A-B432-CDA9-712BEDF34741}"/>
+                  </a:ext>
+                </a:extLst>
+              </p14:cNvPr>
+              <p14:cNvContentPartPr/>
+              <p14:nvPr/>
+            </p14:nvContentPartPr>
+            <p14:xfrm>
+              <a:off x="3388720" y="150427"/>
+              <a:ext cx="360" cy="360"/>
+            </p14:xfrm>
+          </p:contentPart>
+        </mc:Choice>
+        <mc:Fallback>
+          <p:pic>
+            <p:nvPicPr>
+              <p:cNvPr id="2" name="Ink 1">
+                <a:extLst>
+                  <a:ext uri="{FF2B5EF4-FFF2-40B4-BE49-F238E27FC236}">
+                    <a16:creationId xmlns:a16="http://schemas.microsoft.com/office/drawing/2014/main" id="{DFA62668-2D1A-B432-CDA9-712BEDF34741}"/>
+                  </a:ext>
+                </a:extLst>
+              </p:cNvPr>
+              <p:cNvPicPr/>
+              <p:nvPr/>
+            </p:nvPicPr>
+            <p:blipFill>
+              <a:blip r:embed="rId4"/>
+              <a:stretch>
+                <a:fillRect/>
+              </a:stretch>
+            </p:blipFill>
+            <p:spPr>
+              <a:xfrm>
+                <a:off x="3380080" y="141787"/>
+                <a:ext cx="18000" cy="18000"/>
+              </a:xfrm>
+              <a:prstGeom prst="rect">
+                <a:avLst/>
+              </a:prstGeom>
+            </p:spPr>
+          </p:pic>
+        </mc:Fallback>
+      </mc:AlternateContent>
+      <p:sp>
+        <p:nvSpPr>
+          <p:cNvPr id="3" name="Oval 2">
+            <a:extLst>
+              <a:ext uri="{FF2B5EF4-FFF2-40B4-BE49-F238E27FC236}">
+                <a16:creationId xmlns:a16="http://schemas.microsoft.com/office/drawing/2014/main" id="{B99EF775-5AD9-699B-41E5-B28AD0DEB17A}"/>
+              </a:ext>
+            </a:extLst>
+          </p:cNvPr>
+          <p:cNvSpPr/>
+          <p:nvPr/>
+        </p:nvSpPr>
+        <p:spPr>
+          <a:xfrm>
+            <a:off x="2508309" y="899450"/>
+            <a:ext cx="2416030" cy="2147581"/>
+          </a:xfrm>
+          <a:prstGeom prst="ellipse">
+            <a:avLst/>
+          </a:prstGeom>
+          <a:noFill/>
+          <a:ln w="38100">
+            <a:solidFill>
+              <a:srgbClr val="FF0000"/>
+            </a:solidFill>
+          </a:ln>
+        </p:spPr>
+        <p:style>
+          <a:lnRef idx="2">
+            <a:schemeClr val="accent1">
+              <a:shade val="50000"/>
+            </a:schemeClr>
+          </a:lnRef>
+          <a:fillRef idx="1">
+            <a:schemeClr val="accent1"/>
+          </a:fillRef>
+          <a:effectRef idx="0">
+            <a:schemeClr val="accent1"/>
+          </a:effectRef>
+          <a:fontRef idx="minor">
+            <a:schemeClr val="lt1"/>
+          </a:fontRef>
+        </p:style>
+        <p:txBody>
+          <a:bodyPr rtlCol="0" anchor="ctr"/>
+          <a:lstStyle/>
+          <a:p>
+            <a:pPr algn="ctr"/>
+            <a:endParaRPr lang="en-CA" dirty="0">
+              <a:solidFill>
+                <a:srgbClr val="FF0000"/>
+              </a:solidFill>
+            </a:endParaRPr>
+          </a:p>
+        </p:txBody>
+      </p:sp>
+    </p:spTree>
+    <p:extLst>
+      <p:ext uri="{BB962C8B-B14F-4D97-AF65-F5344CB8AC3E}">
+        <p14:creationId xmlns:p14="http://schemas.microsoft.com/office/powerpoint/2010/main" val="4008001658"/>
+      </p:ext>
+    </p:extLst>
+  </p:cSld>
+  <p:clrMapOvr>
+    <a:masterClrMapping/>
+  </p:clrMapOvr>
+</p:sld>
+</file>
+
+<file path=ppt/slides/slide4.xml><?xml version="1.0" encoding="utf-8"?>
+<p:sld xmlns:a="http://schemas.openxmlformats.org/drawingml/2006/main" xmlns:r="http://schemas.openxmlformats.org/officeDocument/2006/relationships" xmlns:p="http://schemas.openxmlformats.org/presentationml/2006/main">
+  <p:cSld>
+    <p:spTree>
+      <p:nvGrpSpPr>
+        <p:cNvPr id="1" name=""/>
+        <p:cNvGrpSpPr/>
+        <p:nvPr/>
+      </p:nvGrpSpPr>
+      <p:grpSpPr>
+        <a:xfrm>
+          <a:off x="0" y="0"/>
+          <a:ext cx="0" cy="0"/>
+          <a:chOff x="0" y="0"/>
+          <a:chExt cx="0" cy="0"/>
+        </a:xfrm>
+      </p:grpSpPr>
+      <p:pic>
+        <p:nvPicPr>
+          <p:cNvPr id="6" name="Content Placeholder 5" descr="Map&#10;&#10;Description automatically generated">
+            <a:extLst>
+              <a:ext uri="{FF2B5EF4-FFF2-40B4-BE49-F238E27FC236}">
+                <a16:creationId xmlns:a16="http://schemas.microsoft.com/office/drawing/2014/main" id="{81E9E291-3C57-DEE8-79CA-50E80D624D94}"/>
+              </a:ext>
+            </a:extLst>
+          </p:cNvPr>
+          <p:cNvPicPr>
+            <a:picLocks noGrp="1" noChangeAspect="1"/>
+          </p:cNvPicPr>
+          <p:nvPr>
+            <p:ph sz="half" idx="1"/>
+          </p:nvPr>
+        </p:nvPicPr>
+        <p:blipFill>
+          <a:blip r:embed="rId2">
+            <a:extLst>
+              <a:ext uri="{28A0092B-C50C-407E-A947-70E740481C1C}">
+                <a14:useLocalDpi xmlns:a14="http://schemas.microsoft.com/office/drawing/2010/main" val="0"/>
+              </a:ext>
+            </a:extLst>
+          </a:blip>
+          <a:stretch>
+            <a:fillRect/>
+          </a:stretch>
+        </p:blipFill>
+        <p:spPr>
+          <a:xfrm>
+            <a:off x="0" y="928682"/>
+            <a:ext cx="6186469" cy="5000636"/>
+          </a:xfrm>
+        </p:spPr>
+      </p:pic>
+      <p:sp>
+        <p:nvSpPr>
+          <p:cNvPr id="4" name="Content Placeholder 3">
+            <a:extLst>
+              <a:ext uri="{FF2B5EF4-FFF2-40B4-BE49-F238E27FC236}">
+                <a16:creationId xmlns:a16="http://schemas.microsoft.com/office/drawing/2014/main" id="{ADA678AB-B2F3-074B-5291-E72657E585F2}"/>
+              </a:ext>
+            </a:extLst>
+          </p:cNvPr>
+          <p:cNvSpPr>
+            <a:spLocks noGrp="1"/>
+          </p:cNvSpPr>
+          <p:nvPr>
+            <p:ph sz="half" idx="2"/>
+          </p:nvPr>
+        </p:nvSpPr>
+        <p:spPr>
+          <a:xfrm>
+            <a:off x="6172200" y="823690"/>
+            <a:ext cx="5181600" cy="5413565"/>
+          </a:xfrm>
+        </p:spPr>
+        <p:txBody>
+          <a:bodyPr>
+            <a:normAutofit/>
+          </a:bodyPr>
+          <a:lstStyle/>
+          <a:p>
+            <a:pPr marL="0" indent="0">
+              <a:buNone/>
+            </a:pPr>
+            <a:endParaRPr lang="en-US" sz="1600" dirty="0"/>
+          </a:p>
+          <a:p>
+            <a:pPr marL="0" indent="0" defTabSz="360000">
+              <a:lnSpc>
+                <a:spcPct val="200000"/>
+              </a:lnSpc>
+              <a:spcBef>
+                <a:spcPts val="600"/>
+              </a:spcBef>
+              <a:buNone/>
+            </a:pPr>
+            <a:r>
+              <a:rPr lang="en-CA" sz="1600" dirty="0"/>
+              <a:t>	The next area is known as the Southern Lowlands, mainly in the Peten district of northern Guatemala and adjacent portions of Mexico, Belize and western Honduras, marked on the map in a blue circle. </a:t>
+            </a:r>
+          </a:p>
+        </p:txBody>
+      </p:sp>
+      <mc:AlternateContent xmlns:mc="http://schemas.openxmlformats.org/markup-compatibility/2006">
+        <mc:Choice xmlns:p14="http://schemas.microsoft.com/office/powerpoint/2010/main" Requires="p14">
+          <p:contentPart p14:bwMode="auto" r:id="rId3">
+            <p14:nvContentPartPr>
+              <p14:cNvPr id="2" name="Ink 1">
+                <a:extLst>
+                  <a:ext uri="{FF2B5EF4-FFF2-40B4-BE49-F238E27FC236}">
+                    <a16:creationId xmlns:a16="http://schemas.microsoft.com/office/drawing/2014/main" id="{DFA62668-2D1A-B432-CDA9-712BEDF34741}"/>
+                  </a:ext>
+                </a:extLst>
+              </p14:cNvPr>
+              <p14:cNvContentPartPr/>
+              <p14:nvPr/>
+            </p14:nvContentPartPr>
+            <p14:xfrm>
+              <a:off x="3388720" y="150427"/>
+              <a:ext cx="360" cy="360"/>
+            </p14:xfrm>
+          </p:contentPart>
+        </mc:Choice>
+        <mc:Fallback>
+          <p:pic>
+            <p:nvPicPr>
+              <p:cNvPr id="2" name="Ink 1">
+                <a:extLst>
+                  <a:ext uri="{FF2B5EF4-FFF2-40B4-BE49-F238E27FC236}">
+                    <a16:creationId xmlns:a16="http://schemas.microsoft.com/office/drawing/2014/main" id="{DFA62668-2D1A-B432-CDA9-712BEDF34741}"/>
+                  </a:ext>
+                </a:extLst>
+              </p:cNvPr>
+              <p:cNvPicPr/>
+              <p:nvPr/>
+            </p:nvPicPr>
+            <p:blipFill>
+              <a:blip r:embed="rId4"/>
+              <a:stretch>
+                <a:fillRect/>
+              </a:stretch>
+            </p:blipFill>
+            <p:spPr>
+              <a:xfrm>
+                <a:off x="3379720" y="141427"/>
+                <a:ext cx="18000" cy="18000"/>
+              </a:xfrm>
+              <a:prstGeom prst="rect">
+                <a:avLst/>
+              </a:prstGeom>
+            </p:spPr>
+          </p:pic>
+        </mc:Fallback>
+      </mc:AlternateContent>
+      <p:sp>
+        <p:nvSpPr>
+          <p:cNvPr id="5" name="Oval 4">
+            <a:extLst>
+              <a:ext uri="{FF2B5EF4-FFF2-40B4-BE49-F238E27FC236}">
+                <a16:creationId xmlns:a16="http://schemas.microsoft.com/office/drawing/2014/main" id="{AC25B447-826D-6A22-9B3D-3DA233CA3EF6}"/>
+              </a:ext>
+            </a:extLst>
+          </p:cNvPr>
+          <p:cNvSpPr/>
+          <p:nvPr/>
+        </p:nvSpPr>
+        <p:spPr>
+          <a:xfrm>
+            <a:off x="1488408" y="2835479"/>
+            <a:ext cx="1758132" cy="1486302"/>
+          </a:xfrm>
+          <a:prstGeom prst="ellipse">
+            <a:avLst/>
+          </a:prstGeom>
+          <a:noFill/>
+          <a:ln w="38100"/>
+        </p:spPr>
+        <p:style>
+          <a:lnRef idx="2">
+            <a:schemeClr val="accent1">
+              <a:shade val="50000"/>
+            </a:schemeClr>
+          </a:lnRef>
+          <a:fillRef idx="1">
+            <a:schemeClr val="accent1"/>
+          </a:fillRef>
+          <a:effectRef idx="0">
+            <a:schemeClr val="accent1"/>
+          </a:effectRef>
+          <a:fontRef idx="minor">
+            <a:schemeClr val="lt1"/>
+          </a:fontRef>
+        </p:style>
+        <p:txBody>
+          <a:bodyPr rtlCol="0" anchor="ctr"/>
+          <a:lstStyle/>
+          <a:p>
+            <a:pPr algn="ctr"/>
+            <a:endParaRPr lang="en-CA" dirty="0"/>
+          </a:p>
+        </p:txBody>
+      </p:sp>
+      <p:sp>
+        <p:nvSpPr>
+          <p:cNvPr id="7" name="Oval 6">
+            <a:extLst>
+              <a:ext uri="{FF2B5EF4-FFF2-40B4-BE49-F238E27FC236}">
+                <a16:creationId xmlns:a16="http://schemas.microsoft.com/office/drawing/2014/main" id="{3D440B8E-0857-77E7-954A-C5CF053BE608}"/>
+              </a:ext>
+            </a:extLst>
+          </p:cNvPr>
+          <p:cNvSpPr/>
+          <p:nvPr/>
+        </p:nvSpPr>
+        <p:spPr>
+          <a:xfrm>
+            <a:off x="2986481" y="3947878"/>
+            <a:ext cx="1300293" cy="1396610"/>
+          </a:xfrm>
+          <a:prstGeom prst="ellipse">
+            <a:avLst/>
+          </a:prstGeom>
+          <a:noFill/>
+          <a:ln w="38100"/>
+        </p:spPr>
+        <p:style>
+          <a:lnRef idx="2">
+            <a:schemeClr val="accent1">
+              <a:shade val="50000"/>
+            </a:schemeClr>
+          </a:lnRef>
+          <a:fillRef idx="1">
+            <a:schemeClr val="accent1"/>
+          </a:fillRef>
+          <a:effectRef idx="0">
+            <a:schemeClr val="accent1"/>
+          </a:effectRef>
+          <a:fontRef idx="minor">
+            <a:schemeClr val="lt1"/>
+          </a:fontRef>
+        </p:style>
+        <p:txBody>
+          <a:bodyPr rtlCol="0" anchor="ctr"/>
+          <a:lstStyle/>
+          <a:p>
+            <a:pPr algn="ctr"/>
+            <a:endParaRPr lang="en-CA" dirty="0"/>
+          </a:p>
+        </p:txBody>
+      </p:sp>
+    </p:spTree>
+    <p:extLst>
+      <p:ext uri="{BB962C8B-B14F-4D97-AF65-F5344CB8AC3E}">
+        <p14:creationId xmlns:p14="http://schemas.microsoft.com/office/powerpoint/2010/main" val="3724584351"/>
+      </p:ext>
+    </p:extLst>
+  </p:cSld>
+  <p:clrMapOvr>
+    <a:masterClrMapping/>
+  </p:clrMapOvr>
+</p:sld>
+</file>
+
+<file path=ppt/slides/slide5.xml><?xml version="1.0" encoding="utf-8"?>
+<p:sld xmlns:a="http://schemas.openxmlformats.org/drawingml/2006/main" xmlns:r="http://schemas.openxmlformats.org/officeDocument/2006/relationships" xmlns:p="http://schemas.openxmlformats.org/presentationml/2006/main">
+  <p:cSld>
+    <p:spTree>
+      <p:nvGrpSpPr>
+        <p:cNvPr id="1" name=""/>
+        <p:cNvGrpSpPr/>
+        <p:nvPr/>
+      </p:nvGrpSpPr>
+      <p:grpSpPr>
+        <a:xfrm>
+          <a:off x="0" y="0"/>
+          <a:ext cx="0" cy="0"/>
+          <a:chOff x="0" y="0"/>
+          <a:chExt cx="0" cy="0"/>
+        </a:xfrm>
+      </p:grpSpPr>
+      <p:pic>
+        <p:nvPicPr>
+          <p:cNvPr id="6" name="Content Placeholder 5" descr="Map&#10;&#10;Description automatically generated">
+            <a:extLst>
+              <a:ext uri="{FF2B5EF4-FFF2-40B4-BE49-F238E27FC236}">
+                <a16:creationId xmlns:a16="http://schemas.microsoft.com/office/drawing/2014/main" id="{81E9E291-3C57-DEE8-79CA-50E80D624D94}"/>
+              </a:ext>
+            </a:extLst>
+          </p:cNvPr>
+          <p:cNvPicPr>
+            <a:picLocks noGrp="1" noChangeAspect="1"/>
+          </p:cNvPicPr>
+          <p:nvPr>
+            <p:ph sz="half" idx="1"/>
+          </p:nvPr>
+        </p:nvPicPr>
+        <p:blipFill>
+          <a:blip r:embed="rId2">
+            <a:extLst>
+              <a:ext uri="{28A0092B-C50C-407E-A947-70E740481C1C}">
+                <a14:useLocalDpi xmlns:a14="http://schemas.microsoft.com/office/drawing/2010/main" val="0"/>
+              </a:ext>
+            </a:extLst>
+          </a:blip>
+          <a:stretch>
+            <a:fillRect/>
+          </a:stretch>
+        </p:blipFill>
+        <p:spPr>
+          <a:xfrm>
+            <a:off x="90182" y="721413"/>
+            <a:ext cx="6186469" cy="5000636"/>
+          </a:xfrm>
+        </p:spPr>
+      </p:pic>
+      <p:sp>
+        <p:nvSpPr>
+          <p:cNvPr id="4" name="Content Placeholder 3">
+            <a:extLst>
+              <a:ext uri="{FF2B5EF4-FFF2-40B4-BE49-F238E27FC236}">
+                <a16:creationId xmlns:a16="http://schemas.microsoft.com/office/drawing/2014/main" id="{ADA678AB-B2F3-074B-5291-E72657E585F2}"/>
+              </a:ext>
+            </a:extLst>
+          </p:cNvPr>
+          <p:cNvSpPr>
+            <a:spLocks noGrp="1"/>
+          </p:cNvSpPr>
+          <p:nvPr>
+            <p:ph sz="half" idx="2"/>
+          </p:nvPr>
+        </p:nvSpPr>
+        <p:spPr>
+          <a:xfrm>
+            <a:off x="6172200" y="823690"/>
+            <a:ext cx="5181600" cy="5413565"/>
+          </a:xfrm>
+        </p:spPr>
+        <p:txBody>
+          <a:bodyPr>
+            <a:normAutofit/>
+          </a:bodyPr>
+          <a:lstStyle/>
+          <a:p>
+            <a:pPr marL="0" indent="0">
+              <a:buNone/>
+            </a:pPr>
+            <a:endParaRPr lang="en-US" sz="1600" dirty="0"/>
+          </a:p>
+          <a:p>
+            <a:pPr marL="0" indent="0" defTabSz="360000">
+              <a:lnSpc>
+                <a:spcPct val="200000"/>
+              </a:lnSpc>
+              <a:spcBef>
+                <a:spcPts val="600"/>
+              </a:spcBef>
+              <a:buNone/>
+            </a:pPr>
+            <a:r>
+              <a:rPr lang="en-CA" sz="1600" dirty="0"/>
+              <a:t>	The third and final area, the Southern Highlands, was in the mountainous region of southern Guatemala,  seen here in the black circle. </a:t>
+            </a:r>
+          </a:p>
+        </p:txBody>
+      </p:sp>
+      <mc:AlternateContent xmlns:mc="http://schemas.openxmlformats.org/markup-compatibility/2006">
+        <mc:Choice xmlns:p14="http://schemas.microsoft.com/office/powerpoint/2010/main" Requires="p14">
+          <p:contentPart p14:bwMode="auto" r:id="rId3">
+            <p14:nvContentPartPr>
+              <p14:cNvPr id="2" name="Ink 1">
+                <a:extLst>
+                  <a:ext uri="{FF2B5EF4-FFF2-40B4-BE49-F238E27FC236}">
+                    <a16:creationId xmlns:a16="http://schemas.microsoft.com/office/drawing/2014/main" id="{DFA62668-2D1A-B432-CDA9-712BEDF34741}"/>
+                  </a:ext>
+                </a:extLst>
+              </p14:cNvPr>
+              <p14:cNvContentPartPr/>
+              <p14:nvPr/>
+            </p14:nvContentPartPr>
+            <p14:xfrm>
+              <a:off x="3388720" y="150427"/>
+              <a:ext cx="360" cy="360"/>
+            </p14:xfrm>
+          </p:contentPart>
+        </mc:Choice>
+        <mc:Fallback>
+          <p:pic>
+            <p:nvPicPr>
+              <p:cNvPr id="2" name="Ink 1">
+                <a:extLst>
+                  <a:ext uri="{FF2B5EF4-FFF2-40B4-BE49-F238E27FC236}">
+                    <a16:creationId xmlns:a16="http://schemas.microsoft.com/office/drawing/2014/main" id="{DFA62668-2D1A-B432-CDA9-712BEDF34741}"/>
+                  </a:ext>
+                </a:extLst>
+              </p:cNvPr>
+              <p:cNvPicPr/>
+              <p:nvPr/>
+            </p:nvPicPr>
+            <p:blipFill>
+              <a:blip r:embed="rId4"/>
+              <a:stretch>
+                <a:fillRect/>
+              </a:stretch>
+            </p:blipFill>
+            <p:spPr>
+              <a:xfrm>
+                <a:off x="3379720" y="141427"/>
+                <a:ext cx="18000" cy="18000"/>
+              </a:xfrm>
+              <a:prstGeom prst="rect">
+                <a:avLst/>
+              </a:prstGeom>
+            </p:spPr>
+          </p:pic>
+        </mc:Fallback>
+      </mc:AlternateContent>
+      <p:sp>
+        <p:nvSpPr>
+          <p:cNvPr id="7" name="Oval 6">
+            <a:extLst>
+              <a:ext uri="{FF2B5EF4-FFF2-40B4-BE49-F238E27FC236}">
+                <a16:creationId xmlns:a16="http://schemas.microsoft.com/office/drawing/2014/main" id="{DB5E267D-D6B5-6933-451F-214694C95AAC}"/>
+              </a:ext>
+            </a:extLst>
+          </p:cNvPr>
+          <p:cNvSpPr/>
+          <p:nvPr/>
+        </p:nvSpPr>
+        <p:spPr>
+          <a:xfrm>
+            <a:off x="1426128" y="4152551"/>
+            <a:ext cx="1367405" cy="1332555"/>
+          </a:xfrm>
+          <a:prstGeom prst="ellipse">
+            <a:avLst/>
+          </a:prstGeom>
+          <a:noFill/>
+          <a:ln w="38100">
+            <a:solidFill>
+              <a:schemeClr val="tx1"/>
+            </a:solidFill>
+          </a:ln>
+        </p:spPr>
+        <p:style>
+          <a:lnRef idx="2">
+            <a:schemeClr val="accent1">
+              <a:shade val="50000"/>
+            </a:schemeClr>
+          </a:lnRef>
+          <a:fillRef idx="1">
+            <a:schemeClr val="accent1"/>
+          </a:fillRef>
+          <a:effectRef idx="0">
+            <a:schemeClr val="accent1"/>
+          </a:effectRef>
+          <a:fontRef idx="minor">
+            <a:schemeClr val="lt1"/>
+          </a:fontRef>
+        </p:style>
+        <p:txBody>
+          <a:bodyPr rtlCol="0" anchor="ctr"/>
+          <a:lstStyle/>
+          <a:p>
+            <a:pPr algn="ctr"/>
+            <a:endParaRPr lang="en-CA" dirty="0"/>
+          </a:p>
+        </p:txBody>
+      </p:sp>
+    </p:spTree>
+    <p:extLst>
+      <p:ext uri="{BB962C8B-B14F-4D97-AF65-F5344CB8AC3E}">
+        <p14:creationId xmlns:p14="http://schemas.microsoft.com/office/powerpoint/2010/main" val="3868633426"/>
       </p:ext>
     </p:extLst>
   </p:cSld>

</xml_diff>